<commit_message>
add heuristics to presentation
</commit_message>
<xml_diff>
--- a/Documentation/Presentation for Wit.pptx
+++ b/Documentation/Presentation for Wit.pptx
@@ -4466,6 +4466,200 @@
           </a:prstGeom>
         </p:spPr>
       </p:pic>
+      <p:sp>
+        <p:nvSpPr>
+          <p:cNvPr id="8" name="Freeform 7">
+            <a:extLst>
+              <a:ext uri="{FF2B5EF4-FFF2-40B4-BE49-F238E27FC236}">
+                <a16:creationId xmlns:a16="http://schemas.microsoft.com/office/drawing/2014/main" id="{F6625794-AB0C-E563-85B0-340056D877C4}"/>
+              </a:ext>
+            </a:extLst>
+          </p:cNvPr>
+          <p:cNvSpPr/>
+          <p:nvPr/>
+        </p:nvSpPr>
+        <p:spPr>
+          <a:xfrm>
+            <a:off x="504158" y="1455007"/>
+            <a:ext cx="4230402" cy="4501066"/>
+          </a:xfrm>
+          <a:custGeom>
+            <a:avLst/>
+            <a:gdLst>
+              <a:gd name="connsiteX0" fmla="*/ 3208033 w 4465506"/>
+              <a:gd name="connsiteY0" fmla="*/ 987942 h 4501066"/>
+              <a:gd name="connsiteX1" fmla="*/ 724141 w 4465506"/>
+              <a:gd name="connsiteY1" fmla="*/ 592157 h 4501066"/>
+              <a:gd name="connsiteX2" fmla="*/ 246469 w 4465506"/>
+              <a:gd name="connsiteY2" fmla="*/ 2011524 h 4501066"/>
+              <a:gd name="connsiteX3" fmla="*/ 2088917 w 4465506"/>
+              <a:gd name="connsiteY3" fmla="*/ 1247250 h 4501066"/>
+              <a:gd name="connsiteX4" fmla="*/ 2075269 w 4465506"/>
+              <a:gd name="connsiteY4" fmla="*/ 5303 h 4501066"/>
+              <a:gd name="connsiteX5" fmla="*/ 809 w 4465506"/>
+              <a:gd name="connsiteY5" fmla="*/ 1765865 h 4501066"/>
+              <a:gd name="connsiteX6" fmla="*/ 1829609 w 4465506"/>
+              <a:gd name="connsiteY6" fmla="*/ 2571083 h 4501066"/>
+              <a:gd name="connsiteX7" fmla="*/ 2075269 w 4465506"/>
+              <a:gd name="connsiteY7" fmla="*/ 1206306 h 4501066"/>
+              <a:gd name="connsiteX8" fmla="*/ 751436 w 4465506"/>
+              <a:gd name="connsiteY8" fmla="*/ 3608312 h 4501066"/>
+              <a:gd name="connsiteX9" fmla="*/ 4463627 w 4465506"/>
+              <a:gd name="connsiteY9" fmla="*/ 4031393 h 4501066"/>
+            </a:gdLst>
+            <a:ahLst/>
+            <a:cxnLst>
+              <a:cxn ang="0">
+                <a:pos x="connsiteX0" y="connsiteY0"/>
+              </a:cxn>
+              <a:cxn ang="0">
+                <a:pos x="connsiteX1" y="connsiteY1"/>
+              </a:cxn>
+              <a:cxn ang="0">
+                <a:pos x="connsiteX2" y="connsiteY2"/>
+              </a:cxn>
+              <a:cxn ang="0">
+                <a:pos x="connsiteX3" y="connsiteY3"/>
+              </a:cxn>
+              <a:cxn ang="0">
+                <a:pos x="connsiteX4" y="connsiteY4"/>
+              </a:cxn>
+              <a:cxn ang="0">
+                <a:pos x="connsiteX5" y="connsiteY5"/>
+              </a:cxn>
+              <a:cxn ang="0">
+                <a:pos x="connsiteX6" y="connsiteY6"/>
+              </a:cxn>
+              <a:cxn ang="0">
+                <a:pos x="connsiteX7" y="connsiteY7"/>
+              </a:cxn>
+              <a:cxn ang="0">
+                <a:pos x="connsiteX8" y="connsiteY8"/>
+              </a:cxn>
+              <a:cxn ang="0">
+                <a:pos x="connsiteX9" y="connsiteY9"/>
+              </a:cxn>
+            </a:cxnLst>
+            <a:rect l="l" t="t" r="r" b="b"/>
+            <a:pathLst>
+              <a:path w="4465506" h="4501066">
+                <a:moveTo>
+                  <a:pt x="3208033" y="987942"/>
+                </a:moveTo>
+                <a:cubicBezTo>
+                  <a:pt x="2212884" y="704751"/>
+                  <a:pt x="1217735" y="421560"/>
+                  <a:pt x="724141" y="592157"/>
+                </a:cubicBezTo>
+                <a:cubicBezTo>
+                  <a:pt x="230547" y="762754"/>
+                  <a:pt x="19006" y="1902342"/>
+                  <a:pt x="246469" y="2011524"/>
+                </a:cubicBezTo>
+                <a:cubicBezTo>
+                  <a:pt x="473932" y="2120706"/>
+                  <a:pt x="1784117" y="1581620"/>
+                  <a:pt x="2088917" y="1247250"/>
+                </a:cubicBezTo>
+                <a:cubicBezTo>
+                  <a:pt x="2393717" y="912880"/>
+                  <a:pt x="2423287" y="-81133"/>
+                  <a:pt x="2075269" y="5303"/>
+                </a:cubicBezTo>
+                <a:cubicBezTo>
+                  <a:pt x="1727251" y="91739"/>
+                  <a:pt x="41752" y="1338235"/>
+                  <a:pt x="809" y="1765865"/>
+                </a:cubicBezTo>
+                <a:cubicBezTo>
+                  <a:pt x="-40134" y="2193495"/>
+                  <a:pt x="1483866" y="2664343"/>
+                  <a:pt x="1829609" y="2571083"/>
+                </a:cubicBezTo>
+                <a:cubicBezTo>
+                  <a:pt x="2175352" y="2477823"/>
+                  <a:pt x="2254964" y="1033435"/>
+                  <a:pt x="2075269" y="1206306"/>
+                </a:cubicBezTo>
+                <a:cubicBezTo>
+                  <a:pt x="1895574" y="1379177"/>
+                  <a:pt x="353376" y="3137464"/>
+                  <a:pt x="751436" y="3608312"/>
+                </a:cubicBezTo>
+                <a:cubicBezTo>
+                  <a:pt x="1149496" y="4079160"/>
+                  <a:pt x="4556887" y="5098193"/>
+                  <a:pt x="4463627" y="4031393"/>
+                </a:cubicBezTo>
+              </a:path>
+            </a:pathLst>
+          </a:custGeom>
+          <a:ln w="38100">
+            <a:solidFill>
+              <a:srgbClr val="FF0000"/>
+            </a:solidFill>
+            <a:tailEnd type="arrow"/>
+          </a:ln>
+        </p:spPr>
+        <p:style>
+          <a:lnRef idx="1">
+            <a:schemeClr val="accent4"/>
+          </a:lnRef>
+          <a:fillRef idx="0">
+            <a:schemeClr val="accent4"/>
+          </a:fillRef>
+          <a:effectRef idx="0">
+            <a:schemeClr val="accent4"/>
+          </a:effectRef>
+          <a:fontRef idx="minor">
+            <a:schemeClr val="tx1"/>
+          </a:fontRef>
+        </p:style>
+        <p:txBody>
+          <a:bodyPr rtlCol="0" anchor="ctr"/>
+          <a:lstStyle/>
+          <a:p>
+            <a:pPr algn="ctr"/>
+            <a:endParaRPr lang="en-US"/>
+          </a:p>
+        </p:txBody>
+      </p:sp>
+      <p:sp>
+        <p:nvSpPr>
+          <p:cNvPr id="9" name="TextBox 8">
+            <a:extLst>
+              <a:ext uri="{FF2B5EF4-FFF2-40B4-BE49-F238E27FC236}">
+                <a16:creationId xmlns:a16="http://schemas.microsoft.com/office/drawing/2014/main" id="{A0CB46E4-7965-1097-F45B-4457AE8756B4}"/>
+              </a:ext>
+            </a:extLst>
+          </p:cNvPr>
+          <p:cNvSpPr txBox="1"/>
+          <p:nvPr/>
+        </p:nvSpPr>
+        <p:spPr>
+          <a:xfrm>
+            <a:off x="838200" y="2661999"/>
+            <a:ext cx="2152198" cy="400110"/>
+          </a:xfrm>
+          <a:prstGeom prst="rect">
+            <a:avLst/>
+          </a:prstGeom>
+          <a:noFill/>
+        </p:spPr>
+        <p:txBody>
+          <a:bodyPr wrap="square" rtlCol="0">
+            <a:spAutoFit/>
+          </a:bodyPr>
+          <a:lstStyle/>
+          <a:p>
+            <a:r>
+              <a:rPr lang="en-US" sz="2000" b="1" dirty="0"/>
+              <a:t>Heuristics</a:t>
+            </a:r>
+            <a:endParaRPr lang="en-US" b="1" dirty="0"/>
+          </a:p>
+        </p:txBody>
+      </p:sp>
     </p:spTree>
     <p:extLst>
       <p:ext uri="{BB962C8B-B14F-4D97-AF65-F5344CB8AC3E}">

</xml_diff>

<commit_message>
create func to check if persons actually have this pheno vs predicted
</commit_message>
<xml_diff>
--- a/Documentation/Presentation for Wit.pptx
+++ b/Documentation/Presentation for Wit.pptx
@@ -218,7 +218,7 @@
           <a:p>
             <a:fld id="{D411154F-FA9C-9D49-B551-6B642B0358FF}" type="datetimeFigureOut">
               <a:rPr lang="en-US" smtClean="0"/>
-              <a:t>7/21/25</a:t>
+              <a:t>7/22/25</a:t>
             </a:fld>
             <a:endParaRPr lang="en-US"/>
           </a:p>
@@ -632,7 +632,7 @@
           <a:p>
             <a:fld id="{B4629D31-9895-8343-B75D-74DAC439BD95}" type="datetimeFigureOut">
               <a:rPr lang="en-US" smtClean="0"/>
-              <a:t>7/21/25</a:t>
+              <a:t>7/22/25</a:t>
             </a:fld>
             <a:endParaRPr lang="en-US"/>
           </a:p>
@@ -830,7 +830,7 @@
           <a:p>
             <a:fld id="{B4629D31-9895-8343-B75D-74DAC439BD95}" type="datetimeFigureOut">
               <a:rPr lang="en-US" smtClean="0"/>
-              <a:t>7/21/25</a:t>
+              <a:t>7/22/25</a:t>
             </a:fld>
             <a:endParaRPr lang="en-US"/>
           </a:p>
@@ -1038,7 +1038,7 @@
           <a:p>
             <a:fld id="{B4629D31-9895-8343-B75D-74DAC439BD95}" type="datetimeFigureOut">
               <a:rPr lang="en-US" smtClean="0"/>
-              <a:t>7/21/25</a:t>
+              <a:t>7/22/25</a:t>
             </a:fld>
             <a:endParaRPr lang="en-US"/>
           </a:p>
@@ -1236,7 +1236,7 @@
           <a:p>
             <a:fld id="{B4629D31-9895-8343-B75D-74DAC439BD95}" type="datetimeFigureOut">
               <a:rPr lang="en-US" smtClean="0"/>
-              <a:t>7/21/25</a:t>
+              <a:t>7/22/25</a:t>
             </a:fld>
             <a:endParaRPr lang="en-US"/>
           </a:p>
@@ -1511,7 +1511,7 @@
           <a:p>
             <a:fld id="{B4629D31-9895-8343-B75D-74DAC439BD95}" type="datetimeFigureOut">
               <a:rPr lang="en-US" smtClean="0"/>
-              <a:t>7/21/25</a:t>
+              <a:t>7/22/25</a:t>
             </a:fld>
             <a:endParaRPr lang="en-US"/>
           </a:p>
@@ -1776,7 +1776,7 @@
           <a:p>
             <a:fld id="{B4629D31-9895-8343-B75D-74DAC439BD95}" type="datetimeFigureOut">
               <a:rPr lang="en-US" smtClean="0"/>
-              <a:t>7/21/25</a:t>
+              <a:t>7/22/25</a:t>
             </a:fld>
             <a:endParaRPr lang="en-US"/>
           </a:p>
@@ -2188,7 +2188,7 @@
           <a:p>
             <a:fld id="{B4629D31-9895-8343-B75D-74DAC439BD95}" type="datetimeFigureOut">
               <a:rPr lang="en-US" smtClean="0"/>
-              <a:t>7/21/25</a:t>
+              <a:t>7/22/25</a:t>
             </a:fld>
             <a:endParaRPr lang="en-US"/>
           </a:p>
@@ -2329,7 +2329,7 @@
           <a:p>
             <a:fld id="{B4629D31-9895-8343-B75D-74DAC439BD95}" type="datetimeFigureOut">
               <a:rPr lang="en-US" smtClean="0"/>
-              <a:t>7/21/25</a:t>
+              <a:t>7/22/25</a:t>
             </a:fld>
             <a:endParaRPr lang="en-US"/>
           </a:p>
@@ -2442,7 +2442,7 @@
           <a:p>
             <a:fld id="{B4629D31-9895-8343-B75D-74DAC439BD95}" type="datetimeFigureOut">
               <a:rPr lang="en-US" smtClean="0"/>
-              <a:t>7/21/25</a:t>
+              <a:t>7/22/25</a:t>
             </a:fld>
             <a:endParaRPr lang="en-US"/>
           </a:p>
@@ -2753,7 +2753,7 @@
           <a:p>
             <a:fld id="{B4629D31-9895-8343-B75D-74DAC439BD95}" type="datetimeFigureOut">
               <a:rPr lang="en-US" smtClean="0"/>
-              <a:t>7/21/25</a:t>
+              <a:t>7/22/25</a:t>
             </a:fld>
             <a:endParaRPr lang="en-US"/>
           </a:p>
@@ -3041,7 +3041,7 @@
           <a:p>
             <a:fld id="{B4629D31-9895-8343-B75D-74DAC439BD95}" type="datetimeFigureOut">
               <a:rPr lang="en-US" smtClean="0"/>
-              <a:t>7/21/25</a:t>
+              <a:t>7/22/25</a:t>
             </a:fld>
             <a:endParaRPr lang="en-US"/>
           </a:p>
@@ -3282,7 +3282,7 @@
           <a:p>
             <a:fld id="{B4629D31-9895-8343-B75D-74DAC439BD95}" type="datetimeFigureOut">
               <a:rPr lang="en-US" smtClean="0"/>
-              <a:t>7/21/25</a:t>
+              <a:t>7/22/25</a:t>
             </a:fld>
             <a:endParaRPr lang="en-US"/>
           </a:p>
@@ -3906,31 +3906,6 @@
               <a:rPr lang="en-US" dirty="0"/>
               <a:t>Association file</a:t>
             </a:r>
-          </a:p>
-        </p:txBody>
-      </p:sp>
-      <p:sp>
-        <p:nvSpPr>
-          <p:cNvPr id="3" name="Content Placeholder 2">
-            <a:extLst>
-              <a:ext uri="{FF2B5EF4-FFF2-40B4-BE49-F238E27FC236}">
-                <a16:creationId xmlns:a16="http://schemas.microsoft.com/office/drawing/2014/main" id="{BF19E7CE-A4CD-C877-D15B-03EC7867AFA5}"/>
-              </a:ext>
-            </a:extLst>
-          </p:cNvPr>
-          <p:cNvSpPr>
-            <a:spLocks noGrp="1"/>
-          </p:cNvSpPr>
-          <p:nvPr>
-            <p:ph idx="1"/>
-          </p:nvPr>
-        </p:nvSpPr>
-        <p:spPr/>
-        <p:txBody>
-          <a:bodyPr/>
-          <a:lstStyle/>
-          <a:p>
-            <a:endParaRPr lang="en-US"/>
           </a:p>
         </p:txBody>
       </p:sp>

</xml_diff>